<commit_message>
se agregaron evidencias url
</commit_message>
<xml_diff>
--- a/Grupo3_Evidencia1/Grupo3_Evidencia1.pptx
+++ b/Grupo3_Evidencia1/Grupo3_Evidencia1.pptx
@@ -8018,12 +8018,28 @@
         </p:nvSpPr>
         <p:spPr/>
         <p:txBody>
-          <a:bodyPr/>
+          <a:bodyPr>
+            <a:normAutofit/>
+          </a:bodyPr>
           <a:lstStyle/>
           <a:p>
+            <a:pPr rtl="0">
+              <a:spcBef>
+                <a:spcPts val="0"/>
+              </a:spcBef>
+              <a:spcAft>
+                <a:spcPts val="0"/>
+              </a:spcAft>
+            </a:pPr>
             <a:r>
-              <a:rPr lang="es-MX" dirty="0"/>
-              <a:t>GITHUB DEL PROYECTO</a:t>
+              <a:rPr lang="es-PE" b="0" i="0" u="none" strike="noStrike" dirty="0">
+                <a:solidFill>
+                  <a:srgbClr val="FFFFFF"/>
+                </a:solidFill>
+                <a:effectLst/>
+                <a:latin typeface="Merriweather" panose="020B0604020202020204" charset="0"/>
+              </a:rPr>
+              <a:t>EVIDENCIAS:</a:t>
             </a:r>
             <a:endParaRPr lang="es-PE" dirty="0"/>
           </a:p>
@@ -8047,13 +8063,127 @@
         </p:nvSpPr>
         <p:spPr/>
         <p:txBody>
-          <a:bodyPr/>
+          <a:bodyPr>
+            <a:normAutofit fontScale="92500"/>
+          </a:bodyPr>
           <a:lstStyle/>
           <a:p>
+            <a:pPr rtl="0" fontAlgn="base">
+              <a:spcBef>
+                <a:spcPts val="0"/>
+              </a:spcBef>
+              <a:spcAft>
+                <a:spcPts val="0"/>
+              </a:spcAft>
+              <a:buFont typeface="+mj-lt"/>
+              <a:buAutoNum type="arabicPeriod"/>
+            </a:pPr>
             <a:r>
-              <a:rPr lang="es-PE" dirty="0"/>
+              <a:rPr lang="es-MX" sz="1800" b="0" i="0" u="none" strike="noStrike" dirty="0">
+                <a:solidFill>
+                  <a:srgbClr val="000000"/>
+                </a:solidFill>
+                <a:effectLst/>
+                <a:latin typeface="Arial" panose="020B0604020202020204" pitchFamily="34" charset="0"/>
+              </a:rPr>
+              <a:t>BASE DE DATOS: </a:t>
+            </a:r>
+            <a:r>
+              <a:rPr lang="es-MX" sz="1800" b="0" i="0" u="sng" strike="noStrike" dirty="0">
+                <a:solidFill>
+                  <a:srgbClr val="009384"/>
+                </a:solidFill>
+                <a:effectLst/>
+                <a:latin typeface="Arial" panose="020B0604020202020204" pitchFamily="34" charset="0"/>
+                <a:hlinkClick r:id="rId2"/>
+              </a:rPr>
+              <a:t>https://www.datosabiertos.gob.pe/dataset/pruebas-moleculares-para-covid-19-2021-instituto-nacional-de-salud/resource/a49b2d77-6c37</a:t>
+            </a:r>
+            <a:endParaRPr lang="es-MX" sz="1800" b="0" i="0" u="none" strike="noStrike" dirty="0">
+              <a:solidFill>
+                <a:srgbClr val="000000"/>
+              </a:solidFill>
+              <a:effectLst/>
+              <a:latin typeface="Arial" panose="020B0604020202020204" pitchFamily="34" charset="0"/>
+            </a:endParaRPr>
+          </a:p>
+          <a:p>
+            <a:pPr rtl="0" fontAlgn="base">
+              <a:spcBef>
+                <a:spcPts val="0"/>
+              </a:spcBef>
+              <a:spcAft>
+                <a:spcPts val="0"/>
+              </a:spcAft>
+              <a:buFont typeface="+mj-lt"/>
+              <a:buAutoNum type="arabicPeriod"/>
+            </a:pPr>
+            <a:r>
+              <a:rPr lang="es-MX" sz="1800" b="0" i="0" u="none" strike="noStrike" dirty="0">
+                <a:solidFill>
+                  <a:srgbClr val="000000"/>
+                </a:solidFill>
+                <a:effectLst/>
+                <a:latin typeface="Arial" panose="020B0604020202020204" pitchFamily="34" charset="0"/>
+              </a:rPr>
+              <a:t>GITHUB: </a:t>
+            </a:r>
+            <a:r>
+              <a:rPr lang="es-MX" sz="1800" b="0" i="0" u="none" strike="noStrike" dirty="0">
+                <a:solidFill>
+                  <a:srgbClr val="666666"/>
+                </a:solidFill>
+                <a:effectLst/>
+                <a:latin typeface="Roboto" panose="02000000000000000000" pitchFamily="2" charset="0"/>
+              </a:rPr>
               <a:t>https://github.com/Andre-CruzGonzales/proyecto_matematica_aplicada_des_sop_sis.git</a:t>
             </a:r>
+            <a:endParaRPr lang="es-MX" sz="1800" b="0" i="0" u="none" strike="noStrike" dirty="0">
+              <a:solidFill>
+                <a:srgbClr val="000000"/>
+              </a:solidFill>
+              <a:effectLst/>
+              <a:latin typeface="Arial" panose="020B0604020202020204" pitchFamily="34" charset="0"/>
+            </a:endParaRPr>
+          </a:p>
+          <a:p>
+            <a:pPr rtl="0" fontAlgn="base">
+              <a:spcBef>
+                <a:spcPts val="0"/>
+              </a:spcBef>
+              <a:spcAft>
+                <a:spcPts val="0"/>
+              </a:spcAft>
+              <a:buFont typeface="+mj-lt"/>
+              <a:buAutoNum type="arabicPeriod"/>
+            </a:pPr>
+            <a:r>
+              <a:rPr lang="es-MX" sz="1800" b="0" i="0" u="none" strike="noStrike">
+                <a:solidFill>
+                  <a:srgbClr val="000000"/>
+                </a:solidFill>
+                <a:effectLst/>
+                <a:latin typeface="Arial" panose="020B0604020202020204" pitchFamily="34" charset="0"/>
+              </a:rPr>
+              <a:t>DRIVE: </a:t>
+            </a:r>
+            <a:r>
+              <a:rPr lang="es-MX" sz="1800" b="0" i="0" u="none" strike="noStrike">
+                <a:solidFill>
+                  <a:srgbClr val="666666"/>
+                </a:solidFill>
+                <a:effectLst/>
+                <a:latin typeface="Roboto" panose="02000000000000000000" pitchFamily="2" charset="0"/>
+              </a:rPr>
+              <a:t>https://drive.google.com/drive/folders/1DQNIwWCG-Bc_2aYm24AayD5xiFg6KRoT?usp=sharing</a:t>
+            </a:r>
+            <a:endParaRPr lang="es-MX" sz="1800" b="0" i="0" u="none" strike="noStrike">
+              <a:solidFill>
+                <a:srgbClr val="000000"/>
+              </a:solidFill>
+              <a:effectLst/>
+              <a:latin typeface="Arial" panose="020B0604020202020204" pitchFamily="34" charset="0"/>
+            </a:endParaRPr>
           </a:p>
         </p:txBody>
       </p:sp>

</xml_diff>